<commit_message>
Added updated icons (#77)
</commit_message>
<xml_diff>
--- a/favicon.pptx
+++ b/favicon.pptx
@@ -104,6 +104,11 @@
       </a:defRPr>
     </a:lvl9pPr>
   </p:defaultTextStyle>
+  <p:extLst>
+    <p:ext uri="{EFAFB233-063F-42B5-8137-9DF3F51BA10A}">
+      <p15:sldGuideLst xmlns:p15="http://schemas.microsoft.com/office/powerpoint/2012/main"/>
+    </p:ext>
+  </p:extLst>
 </p:presentation>
 </file>
 
@@ -238,7 +243,7 @@
           <a:p>
             <a:fld id="{081C6EE6-F5BF-4295-B9C8-913A2A017E78}" type="datetimeFigureOut">
               <a:rPr lang="en-US" smtClean="0"/>
-              <a:t>4/23/2019</a:t>
+              <a:t>12/20/2020</a:t>
             </a:fld>
             <a:endParaRPr lang="en-US"/>
           </a:p>
@@ -408,7 +413,7 @@
           <a:p>
             <a:fld id="{081C6EE6-F5BF-4295-B9C8-913A2A017E78}" type="datetimeFigureOut">
               <a:rPr lang="en-US" smtClean="0"/>
-              <a:t>4/23/2019</a:t>
+              <a:t>12/20/2020</a:t>
             </a:fld>
             <a:endParaRPr lang="en-US"/>
           </a:p>
@@ -588,7 +593,7 @@
           <a:p>
             <a:fld id="{081C6EE6-F5BF-4295-B9C8-913A2A017E78}" type="datetimeFigureOut">
               <a:rPr lang="en-US" smtClean="0"/>
-              <a:t>4/23/2019</a:t>
+              <a:t>12/20/2020</a:t>
             </a:fld>
             <a:endParaRPr lang="en-US"/>
           </a:p>
@@ -758,7 +763,7 @@
           <a:p>
             <a:fld id="{081C6EE6-F5BF-4295-B9C8-913A2A017E78}" type="datetimeFigureOut">
               <a:rPr lang="en-US" smtClean="0"/>
-              <a:t>4/23/2019</a:t>
+              <a:t>12/20/2020</a:t>
             </a:fld>
             <a:endParaRPr lang="en-US"/>
           </a:p>
@@ -1002,7 +1007,7 @@
           <a:p>
             <a:fld id="{081C6EE6-F5BF-4295-B9C8-913A2A017E78}" type="datetimeFigureOut">
               <a:rPr lang="en-US" smtClean="0"/>
-              <a:t>4/23/2019</a:t>
+              <a:t>12/20/2020</a:t>
             </a:fld>
             <a:endParaRPr lang="en-US"/>
           </a:p>
@@ -1234,7 +1239,7 @@
           <a:p>
             <a:fld id="{081C6EE6-F5BF-4295-B9C8-913A2A017E78}" type="datetimeFigureOut">
               <a:rPr lang="en-US" smtClean="0"/>
-              <a:t>4/23/2019</a:t>
+              <a:t>12/20/2020</a:t>
             </a:fld>
             <a:endParaRPr lang="en-US"/>
           </a:p>
@@ -1601,7 +1606,7 @@
           <a:p>
             <a:fld id="{081C6EE6-F5BF-4295-B9C8-913A2A017E78}" type="datetimeFigureOut">
               <a:rPr lang="en-US" smtClean="0"/>
-              <a:t>4/23/2019</a:t>
+              <a:t>12/20/2020</a:t>
             </a:fld>
             <a:endParaRPr lang="en-US"/>
           </a:p>
@@ -1719,7 +1724,7 @@
           <a:p>
             <a:fld id="{081C6EE6-F5BF-4295-B9C8-913A2A017E78}" type="datetimeFigureOut">
               <a:rPr lang="en-US" smtClean="0"/>
-              <a:t>4/23/2019</a:t>
+              <a:t>12/20/2020</a:t>
             </a:fld>
             <a:endParaRPr lang="en-US"/>
           </a:p>
@@ -1814,7 +1819,7 @@
           <a:p>
             <a:fld id="{081C6EE6-F5BF-4295-B9C8-913A2A017E78}" type="datetimeFigureOut">
               <a:rPr lang="en-US" smtClean="0"/>
-              <a:t>4/23/2019</a:t>
+              <a:t>12/20/2020</a:t>
             </a:fld>
             <a:endParaRPr lang="en-US"/>
           </a:p>
@@ -2091,7 +2096,7 @@
           <a:p>
             <a:fld id="{081C6EE6-F5BF-4295-B9C8-913A2A017E78}" type="datetimeFigureOut">
               <a:rPr lang="en-US" smtClean="0"/>
-              <a:t>4/23/2019</a:t>
+              <a:t>12/20/2020</a:t>
             </a:fld>
             <a:endParaRPr lang="en-US"/>
           </a:p>
@@ -2348,7 +2353,7 @@
           <a:p>
             <a:fld id="{081C6EE6-F5BF-4295-B9C8-913A2A017E78}" type="datetimeFigureOut">
               <a:rPr lang="en-US" smtClean="0"/>
-              <a:t>4/23/2019</a:t>
+              <a:t>12/20/2020</a:t>
             </a:fld>
             <a:endParaRPr lang="en-US"/>
           </a:p>
@@ -2561,7 +2566,7 @@
           <a:p>
             <a:fld id="{081C6EE6-F5BF-4295-B9C8-913A2A017E78}" type="datetimeFigureOut">
               <a:rPr lang="en-US" smtClean="0"/>
-              <a:t>4/23/2019</a:t>
+              <a:t>12/20/2020</a:t>
             </a:fld>
             <a:endParaRPr lang="en-US"/>
           </a:p>
@@ -2952,6 +2957,14 @@
 <file path=ppt/slides/slide1.xml><?xml version="1.0" encoding="utf-8"?>
 <p:sld xmlns:a="http://schemas.openxmlformats.org/drawingml/2006/main" xmlns:r="http://schemas.openxmlformats.org/officeDocument/2006/relationships" xmlns:p="http://schemas.openxmlformats.org/presentationml/2006/main">
   <p:cSld>
+    <p:bg>
+      <p:bgPr>
+        <a:solidFill>
+          <a:schemeClr val="tx1"/>
+        </a:solidFill>
+        <a:effectLst/>
+      </p:bgPr>
+    </p:bg>
     <p:spTree>
       <p:nvGrpSpPr>
         <p:cNvPr id="1" name=""/>
@@ -2966,6 +2979,58 @@
           <a:chExt cx="0" cy="0"/>
         </a:xfrm>
       </p:grpSpPr>
+      <p:sp>
+        <p:nvSpPr>
+          <p:cNvPr id="3" name="Rectangle 2">
+            <a:extLst>
+              <a:ext uri="{FF2B5EF4-FFF2-40B4-BE49-F238E27FC236}">
+                <a16:creationId xmlns:a16="http://schemas.microsoft.com/office/drawing/2014/main" id="{227B9C07-4A66-4EDA-89CA-0F6FD6504EA7}"/>
+              </a:ext>
+            </a:extLst>
+          </p:cNvPr>
+          <p:cNvSpPr/>
+          <p:nvPr/>
+        </p:nvSpPr>
+        <p:spPr>
+          <a:xfrm>
+            <a:off x="0" y="0"/>
+            <a:ext cx="6480175" cy="6480175"/>
+          </a:xfrm>
+          <a:prstGeom prst="rect">
+            <a:avLst/>
+          </a:prstGeom>
+          <a:solidFill>
+            <a:schemeClr val="tx1"/>
+          </a:solidFill>
+          <a:ln>
+            <a:noFill/>
+          </a:ln>
+        </p:spPr>
+        <p:style>
+          <a:lnRef idx="2">
+            <a:schemeClr val="accent1">
+              <a:shade val="50000"/>
+            </a:schemeClr>
+          </a:lnRef>
+          <a:fillRef idx="1">
+            <a:schemeClr val="accent1"/>
+          </a:fillRef>
+          <a:effectRef idx="0">
+            <a:schemeClr val="accent1"/>
+          </a:effectRef>
+          <a:fontRef idx="minor">
+            <a:schemeClr val="lt1"/>
+          </a:fontRef>
+        </p:style>
+        <p:txBody>
+          <a:bodyPr rtlCol="0" anchor="ctr"/>
+          <a:lstStyle/>
+          <a:p>
+            <a:pPr algn="ctr"/>
+            <a:endParaRPr lang="en-US"/>
+          </a:p>
+        </p:txBody>
+      </p:sp>
       <p:grpSp>
         <p:nvGrpSpPr>
           <p:cNvPr id="13" name="Group 12">
@@ -2980,8 +3045,8 @@
         </p:nvGrpSpPr>
         <p:grpSpPr>
           <a:xfrm>
-            <a:off x="257127" y="257127"/>
-            <a:ext cx="5965920" cy="5965920"/>
+            <a:off x="629799" y="629799"/>
+            <a:ext cx="5220576" cy="5220576"/>
             <a:chOff x="2025100" y="462305"/>
             <a:chExt cx="5965920" cy="5965920"/>
           </a:xfrm>
@@ -3011,7 +3076,7 @@
             </a:solidFill>
             <a:ln>
               <a:solidFill>
-                <a:schemeClr val="tx1"/>
+                <a:schemeClr val="bg1"/>
               </a:solidFill>
             </a:ln>
           </p:spPr>
@@ -3070,7 +3135,7 @@
             </a:solidFill>
             <a:ln>
               <a:solidFill>
-                <a:schemeClr val="tx1"/>
+                <a:schemeClr val="bg1"/>
               </a:solidFill>
             </a:ln>
           </p:spPr>
@@ -3129,7 +3194,7 @@
             </a:solidFill>
             <a:ln>
               <a:solidFill>
-                <a:schemeClr val="tx1"/>
+                <a:schemeClr val="bg1"/>
               </a:solidFill>
             </a:ln>
           </p:spPr>
@@ -3188,7 +3253,7 @@
             </a:solidFill>
             <a:ln>
               <a:solidFill>
-                <a:schemeClr val="tx1"/>
+                <a:schemeClr val="bg1"/>
               </a:solidFill>
             </a:ln>
           </p:spPr>
@@ -3247,7 +3312,7 @@
             </a:solidFill>
             <a:ln>
               <a:solidFill>
-                <a:schemeClr val="tx1"/>
+                <a:schemeClr val="bg1"/>
               </a:solidFill>
             </a:ln>
           </p:spPr>
@@ -3306,7 +3371,7 @@
             </a:solidFill>
             <a:ln>
               <a:solidFill>
-                <a:schemeClr val="tx1"/>
+                <a:schemeClr val="bg1"/>
               </a:solidFill>
             </a:ln>
           </p:spPr>
@@ -3365,7 +3430,7 @@
             </a:solidFill>
             <a:ln>
               <a:solidFill>
-                <a:schemeClr val="tx1"/>
+                <a:schemeClr val="bg1"/>
               </a:solidFill>
             </a:ln>
           </p:spPr>
@@ -3424,7 +3489,7 @@
             </a:solidFill>
             <a:ln>
               <a:solidFill>
-                <a:schemeClr val="tx1"/>
+                <a:schemeClr val="bg1"/>
               </a:solidFill>
             </a:ln>
           </p:spPr>
@@ -3483,7 +3548,7 @@
             </a:solidFill>
             <a:ln>
               <a:solidFill>
-                <a:schemeClr val="tx1"/>
+                <a:schemeClr val="bg1"/>
               </a:solidFill>
             </a:ln>
           </p:spPr>

</xml_diff>